<commit_message>
Change font size for buttons
</commit_message>
<xml_diff>
--- a/Diagrams/Lamps positioning.pptx
+++ b/Diagrams/Lamps positioning.pptx
@@ -104,6 +104,11 @@
       </a:defRPr>
     </a:lvl9pPr>
   </p:defaultTextStyle>
+  <p:extLst>
+    <p:ext uri="{EFAFB233-063F-42B5-8137-9DF3F51BA10A}">
+      <p15:sldGuideLst xmlns:p15="http://schemas.microsoft.com/office/powerpoint/2012/main"/>
+    </p:ext>
+  </p:extLst>
 </p:presentation>
 </file>
 
@@ -238,7 +243,7 @@
           <a:p>
             <a:fld id="{64C2FF8D-5166-4177-B5DC-36A33164D5CA}" type="datetimeFigureOut">
               <a:rPr lang="pt-BR" smtClean="0"/>
-              <a:t>05/07/2016</a:t>
+              <a:t>06/07/2016</a:t>
             </a:fld>
             <a:endParaRPr lang="pt-BR"/>
           </a:p>
@@ -408,7 +413,7 @@
           <a:p>
             <a:fld id="{64C2FF8D-5166-4177-B5DC-36A33164D5CA}" type="datetimeFigureOut">
               <a:rPr lang="pt-BR" smtClean="0"/>
-              <a:t>05/07/2016</a:t>
+              <a:t>06/07/2016</a:t>
             </a:fld>
             <a:endParaRPr lang="pt-BR"/>
           </a:p>
@@ -588,7 +593,7 @@
           <a:p>
             <a:fld id="{64C2FF8D-5166-4177-B5DC-36A33164D5CA}" type="datetimeFigureOut">
               <a:rPr lang="pt-BR" smtClean="0"/>
-              <a:t>05/07/2016</a:t>
+              <a:t>06/07/2016</a:t>
             </a:fld>
             <a:endParaRPr lang="pt-BR"/>
           </a:p>
@@ -758,7 +763,7 @@
           <a:p>
             <a:fld id="{64C2FF8D-5166-4177-B5DC-36A33164D5CA}" type="datetimeFigureOut">
               <a:rPr lang="pt-BR" smtClean="0"/>
-              <a:t>05/07/2016</a:t>
+              <a:t>06/07/2016</a:t>
             </a:fld>
             <a:endParaRPr lang="pt-BR"/>
           </a:p>
@@ -1004,7 +1009,7 @@
           <a:p>
             <a:fld id="{64C2FF8D-5166-4177-B5DC-36A33164D5CA}" type="datetimeFigureOut">
               <a:rPr lang="pt-BR" smtClean="0"/>
-              <a:t>05/07/2016</a:t>
+              <a:t>06/07/2016</a:t>
             </a:fld>
             <a:endParaRPr lang="pt-BR"/>
           </a:p>
@@ -1236,7 +1241,7 @@
           <a:p>
             <a:fld id="{64C2FF8D-5166-4177-B5DC-36A33164D5CA}" type="datetimeFigureOut">
               <a:rPr lang="pt-BR" smtClean="0"/>
-              <a:t>05/07/2016</a:t>
+              <a:t>06/07/2016</a:t>
             </a:fld>
             <a:endParaRPr lang="pt-BR"/>
           </a:p>
@@ -1603,7 +1608,7 @@
           <a:p>
             <a:fld id="{64C2FF8D-5166-4177-B5DC-36A33164D5CA}" type="datetimeFigureOut">
               <a:rPr lang="pt-BR" smtClean="0"/>
-              <a:t>05/07/2016</a:t>
+              <a:t>06/07/2016</a:t>
             </a:fld>
             <a:endParaRPr lang="pt-BR"/>
           </a:p>
@@ -1721,7 +1726,7 @@
           <a:p>
             <a:fld id="{64C2FF8D-5166-4177-B5DC-36A33164D5CA}" type="datetimeFigureOut">
               <a:rPr lang="pt-BR" smtClean="0"/>
-              <a:t>05/07/2016</a:t>
+              <a:t>06/07/2016</a:t>
             </a:fld>
             <a:endParaRPr lang="pt-BR"/>
           </a:p>
@@ -1816,7 +1821,7 @@
           <a:p>
             <a:fld id="{64C2FF8D-5166-4177-B5DC-36A33164D5CA}" type="datetimeFigureOut">
               <a:rPr lang="pt-BR" smtClean="0"/>
-              <a:t>05/07/2016</a:t>
+              <a:t>06/07/2016</a:t>
             </a:fld>
             <a:endParaRPr lang="pt-BR"/>
           </a:p>
@@ -2093,7 +2098,7 @@
           <a:p>
             <a:fld id="{64C2FF8D-5166-4177-B5DC-36A33164D5CA}" type="datetimeFigureOut">
               <a:rPr lang="pt-BR" smtClean="0"/>
-              <a:t>05/07/2016</a:t>
+              <a:t>06/07/2016</a:t>
             </a:fld>
             <a:endParaRPr lang="pt-BR"/>
           </a:p>
@@ -2346,7 +2351,7 @@
           <a:p>
             <a:fld id="{64C2FF8D-5166-4177-B5DC-36A33164D5CA}" type="datetimeFigureOut">
               <a:rPr lang="pt-BR" smtClean="0"/>
-              <a:t>05/07/2016</a:t>
+              <a:t>06/07/2016</a:t>
             </a:fld>
             <a:endParaRPr lang="pt-BR"/>
           </a:p>
@@ -2559,7 +2564,7 @@
           <a:p>
             <a:fld id="{64C2FF8D-5166-4177-B5DC-36A33164D5CA}" type="datetimeFigureOut">
               <a:rPr lang="pt-BR" smtClean="0"/>
-              <a:t>05/07/2016</a:t>
+              <a:t>06/07/2016</a:t>
             </a:fld>
             <a:endParaRPr lang="pt-BR"/>
           </a:p>
@@ -3245,7 +3250,7 @@
             <a:p>
               <a:pPr algn="ctr"/>
               <a:r>
-                <a:rPr lang="pt-BR" dirty="0"/>
+                <a:rPr lang="pt-BR" sz="3200" dirty="0"/>
                 <a:t>L</a:t>
               </a:r>
             </a:p>
@@ -3288,7 +3293,7 @@
             <a:p>
               <a:pPr algn="ctr"/>
               <a:r>
-                <a:rPr lang="pt-BR" dirty="0"/>
+                <a:rPr lang="pt-BR" sz="3200" dirty="0"/>
                 <a:t>R</a:t>
               </a:r>
             </a:p>

</xml_diff>